<commit_message>
pull push add complete
</commit_message>
<xml_diff>
--- a/git hub ori.pptx
+++ b/git hub ori.pptx
@@ -9,6 +9,7 @@
     <p:sldId id="257" r:id="rId3"/>
     <p:sldId id="258" r:id="rId4"/>
     <p:sldId id="259" r:id="rId5"/>
+    <p:sldId id="260" r:id="rId6"/>
   </p:sldIdLst>
   <p:sldSz cx="12192000" cy="6858000"/>
   <p:notesSz cx="6858000" cy="9144000"/>
@@ -107,6 +108,11 @@
       </a:defRPr>
     </a:lvl9pPr>
   </p:defaultTextStyle>
+  <p:extLst>
+    <p:ext uri="{EFAFB233-063F-42B5-8137-9DF3F51BA10A}">
+      <p15:sldGuideLst xmlns:p15="http://schemas.microsoft.com/office/powerpoint/2012/main"/>
+    </p:ext>
+  </p:extLst>
 </p:presentation>
 </file>
 
@@ -3726,7 +3732,7 @@
             </a:r>
             <a:r>
               <a:rPr lang="en-US" altLang="ko-KR" dirty="0"/>
-              <a:t> -&gt; git remote origin https~~~ </a:t>
+              <a:t> -&gt; git remote add origin https~~~ </a:t>
             </a:r>
             <a:endParaRPr lang="ko-KR" altLang="en-US" dirty="0"/>
           </a:p>
@@ -3823,7 +3829,7 @@
         </p:nvSpPr>
         <p:spPr>
           <a:xfrm>
-            <a:off x="365760" y="1577816"/>
+            <a:off x="777240" y="1577816"/>
             <a:ext cx="8214360" cy="646331"/>
           </a:xfrm>
           <a:prstGeom prst="rect">
@@ -3890,10 +3896,10 @@
       </p:sp>
       <p:sp>
         <p:nvSpPr>
-          <p:cNvPr id="6" name="TextBox 5">
-            <a:extLst>
-              <a:ext uri="{FF2B5EF4-FFF2-40B4-BE49-F238E27FC236}">
-                <a16:creationId xmlns:a16="http://schemas.microsoft.com/office/drawing/2014/main" id="{02EDDB17-C937-4F79-B92D-00174146B5FD}"/>
+          <p:cNvPr id="2" name="TextBox 1">
+            <a:extLst>
+              <a:ext uri="{FF2B5EF4-FFF2-40B4-BE49-F238E27FC236}">
+                <a16:creationId xmlns:a16="http://schemas.microsoft.com/office/drawing/2014/main" id="{089C9632-E5E6-48CC-89DF-120B45C88792}"/>
               </a:ext>
             </a:extLst>
           </p:cNvPr>
@@ -3902,7 +3908,166 @@
         </p:nvSpPr>
         <p:spPr>
           <a:xfrm>
-            <a:off x="495300" y="4633853"/>
+            <a:off x="762000" y="2697480"/>
+            <a:ext cx="2316480" cy="646331"/>
+          </a:xfrm>
+          <a:prstGeom prst="rect">
+            <a:avLst/>
+          </a:prstGeom>
+          <a:noFill/>
+        </p:spPr>
+        <p:txBody>
+          <a:bodyPr wrap="square" rtlCol="0">
+            <a:spAutoFit/>
+          </a:bodyPr>
+          <a:lstStyle/>
+          <a:p>
+            <a:r>
+              <a:rPr lang="ko-KR" altLang="en-US" dirty="0"/>
+              <a:t>파일을 가져올 폴더 </a:t>
+            </a:r>
+            <a:r>
+              <a:rPr lang="en-US" altLang="ko-KR" dirty="0"/>
+              <a:t>git bash </a:t>
+            </a:r>
+            <a:r>
+              <a:rPr lang="ko-KR" altLang="en-US" dirty="0"/>
+              <a:t>열기</a:t>
+            </a:r>
+          </a:p>
+        </p:txBody>
+      </p:sp>
+      <p:sp>
+        <p:nvSpPr>
+          <p:cNvPr id="7" name="TextBox 6">
+            <a:extLst>
+              <a:ext uri="{FF2B5EF4-FFF2-40B4-BE49-F238E27FC236}">
+                <a16:creationId xmlns:a16="http://schemas.microsoft.com/office/drawing/2014/main" id="{4F321015-EECF-42FE-893C-B3ADB116E7AD}"/>
+              </a:ext>
+            </a:extLst>
+          </p:cNvPr>
+          <p:cNvSpPr txBox="1"/>
+          <p:nvPr/>
+        </p:nvSpPr>
+        <p:spPr>
+          <a:xfrm>
+            <a:off x="762000" y="3817144"/>
+            <a:ext cx="8976360" cy="923330"/>
+          </a:xfrm>
+          <a:prstGeom prst="rect">
+            <a:avLst/>
+          </a:prstGeom>
+          <a:noFill/>
+        </p:spPr>
+        <p:txBody>
+          <a:bodyPr wrap="square" rtlCol="0">
+            <a:spAutoFit/>
+          </a:bodyPr>
+          <a:lstStyle/>
+          <a:p>
+            <a:r>
+              <a:rPr lang="en-US" altLang="ko-KR" dirty="0"/>
+              <a:t>git </a:t>
+            </a:r>
+            <a:r>
+              <a:rPr lang="en-US" altLang="ko-KR" dirty="0" err="1"/>
+              <a:t>init</a:t>
+            </a:r>
+            <a:r>
+              <a:rPr lang="en-US" altLang="ko-KR" dirty="0"/>
+              <a:t> -&gt; git remote  origin add https~~_</a:t>
+            </a:r>
+            <a:r>
+              <a:rPr lang="ko-KR" altLang="en-US" dirty="0"/>
+              <a:t>여기서는 가져올 </a:t>
+            </a:r>
+            <a:r>
+              <a:rPr lang="en-US" altLang="ko-KR" dirty="0"/>
+              <a:t>git</a:t>
+            </a:r>
+            <a:r>
+              <a:rPr lang="ko-KR" altLang="en-US" dirty="0"/>
+              <a:t>의 주소</a:t>
+            </a:r>
+            <a:endParaRPr lang="en-US" altLang="ko-KR" dirty="0"/>
+          </a:p>
+          <a:p>
+            <a:endParaRPr lang="en-US" altLang="ko-KR" dirty="0"/>
+          </a:p>
+          <a:p>
+            <a:r>
+              <a:rPr lang="en-US" altLang="ko-KR" dirty="0"/>
+              <a:t>git</a:t>
+            </a:r>
+            <a:r>
+              <a:rPr lang="ko-KR" altLang="en-US" dirty="0"/>
+              <a:t> </a:t>
+            </a:r>
+            <a:r>
+              <a:rPr lang="en-US" altLang="ko-KR" dirty="0"/>
+              <a:t>pull</a:t>
+            </a:r>
+            <a:r>
+              <a:rPr lang="ko-KR" altLang="en-US" dirty="0"/>
+              <a:t> </a:t>
+            </a:r>
+            <a:r>
+              <a:rPr lang="en-US" altLang="ko-KR" dirty="0"/>
+              <a:t>origin master _</a:t>
+            </a:r>
+            <a:r>
+              <a:rPr lang="ko-KR" altLang="en-US" dirty="0" err="1"/>
+              <a:t>땡겨옴</a:t>
+            </a:r>
+            <a:endParaRPr lang="ko-KR" altLang="en-US" dirty="0"/>
+          </a:p>
+        </p:txBody>
+      </p:sp>
+    </p:spTree>
+    <p:extLst>
+      <p:ext uri="{BB962C8B-B14F-4D97-AF65-F5344CB8AC3E}">
+        <p14:creationId xmlns:p14="http://schemas.microsoft.com/office/powerpoint/2010/main" val="1118394014"/>
+      </p:ext>
+    </p:extLst>
+  </p:cSld>
+  <p:clrMapOvr>
+    <a:masterClrMapping/>
+  </p:clrMapOvr>
+</p:sld>
+</file>
+
+<file path=ppt/slides/slide5.xml><?xml version="1.0" encoding="utf-8"?>
+<p:sld xmlns:a="http://schemas.openxmlformats.org/drawingml/2006/main" xmlns:r="http://schemas.openxmlformats.org/officeDocument/2006/relationships" xmlns:p="http://schemas.openxmlformats.org/presentationml/2006/main">
+  <p:cSld>
+    <p:spTree>
+      <p:nvGrpSpPr>
+        <p:cNvPr id="1" name=""/>
+        <p:cNvGrpSpPr/>
+        <p:nvPr/>
+      </p:nvGrpSpPr>
+      <p:grpSpPr>
+        <a:xfrm>
+          <a:off x="0" y="0"/>
+          <a:ext cx="0" cy="0"/>
+          <a:chOff x="0" y="0"/>
+          <a:chExt cx="0" cy="0"/>
+        </a:xfrm>
+      </p:grpSpPr>
+      <p:sp>
+        <p:nvSpPr>
+          <p:cNvPr id="4" name="TextBox 3">
+            <a:extLst>
+              <a:ext uri="{FF2B5EF4-FFF2-40B4-BE49-F238E27FC236}">
+                <a16:creationId xmlns:a16="http://schemas.microsoft.com/office/drawing/2014/main" id="{84E5F589-C2A6-43DA-8764-A4413C014D80}"/>
+              </a:ext>
+            </a:extLst>
+          </p:cNvPr>
+          <p:cNvSpPr txBox="1"/>
+          <p:nvPr/>
+        </p:nvSpPr>
+        <p:spPr>
+          <a:xfrm>
+            <a:off x="777240" y="2971860"/>
             <a:ext cx="7810500" cy="2308324"/>
           </a:xfrm>
           <a:prstGeom prst="rect">
@@ -3985,17 +4150,164 @@
               <a:t>git push origin +master _</a:t>
             </a:r>
             <a:r>
-              <a:rPr lang="ko-KR" altLang="en-US"/>
+              <a:rPr lang="ko-KR" altLang="en-US" dirty="0"/>
               <a:t>실제로 변경사항을 올린다</a:t>
             </a:r>
-            <a:endParaRPr lang="en-US" altLang="ko-KR"/>
+            <a:endParaRPr lang="en-US" altLang="ko-KR" dirty="0"/>
+          </a:p>
+        </p:txBody>
+      </p:sp>
+      <p:sp>
+        <p:nvSpPr>
+          <p:cNvPr id="5" name="TextBox 4">
+            <a:extLst>
+              <a:ext uri="{FF2B5EF4-FFF2-40B4-BE49-F238E27FC236}">
+                <a16:creationId xmlns:a16="http://schemas.microsoft.com/office/drawing/2014/main" id="{80952E93-320A-470B-B98E-AF10E5111454}"/>
+              </a:ext>
+            </a:extLst>
+          </p:cNvPr>
+          <p:cNvSpPr txBox="1"/>
+          <p:nvPr/>
+        </p:nvSpPr>
+        <p:spPr>
+          <a:xfrm>
+            <a:off x="548640" y="670560"/>
+            <a:ext cx="3429000" cy="369332"/>
+          </a:xfrm>
+          <a:prstGeom prst="rect">
+            <a:avLst/>
+          </a:prstGeom>
+          <a:noFill/>
+        </p:spPr>
+        <p:txBody>
+          <a:bodyPr wrap="square" rtlCol="0">
+            <a:spAutoFit/>
+          </a:bodyPr>
+          <a:lstStyle/>
+          <a:p>
+            <a:r>
+              <a:rPr lang="en-US" altLang="ko-KR" dirty="0"/>
+              <a:t>Push </a:t>
+            </a:r>
+            <a:r>
+              <a:rPr lang="ko-KR" altLang="en-US" dirty="0"/>
+              <a:t>전엔 </a:t>
+            </a:r>
+            <a:r>
+              <a:rPr lang="en-US" altLang="ko-KR" dirty="0"/>
+              <a:t>Pull</a:t>
+            </a:r>
+            <a:r>
+              <a:rPr lang="ko-KR" altLang="en-US" dirty="0"/>
+              <a:t>이 있다</a:t>
+            </a:r>
+          </a:p>
+        </p:txBody>
+      </p:sp>
+      <p:sp>
+        <p:nvSpPr>
+          <p:cNvPr id="6" name="TextBox 5">
+            <a:extLst>
+              <a:ext uri="{FF2B5EF4-FFF2-40B4-BE49-F238E27FC236}">
+                <a16:creationId xmlns:a16="http://schemas.microsoft.com/office/drawing/2014/main" id="{7B3EEFDE-D7C5-4211-9919-54037FD2BAA4}"/>
+              </a:ext>
+            </a:extLst>
+          </p:cNvPr>
+          <p:cNvSpPr txBox="1"/>
+          <p:nvPr/>
+        </p:nvSpPr>
+        <p:spPr>
+          <a:xfrm>
+            <a:off x="777240" y="1577816"/>
+            <a:ext cx="8214360" cy="923330"/>
+          </a:xfrm>
+          <a:prstGeom prst="rect">
+            <a:avLst/>
+          </a:prstGeom>
+          <a:noFill/>
+        </p:spPr>
+        <p:txBody>
+          <a:bodyPr wrap="square" rtlCol="0">
+            <a:spAutoFit/>
+          </a:bodyPr>
+          <a:lstStyle/>
+          <a:p>
+            <a:r>
+              <a:rPr lang="ko-KR" altLang="en-US" dirty="0"/>
+              <a:t>변경사항이 </a:t>
+            </a:r>
+            <a:r>
+              <a:rPr lang="ko-KR" altLang="en-US" dirty="0" err="1"/>
+              <a:t>있을경우</a:t>
+            </a:r>
+            <a:r>
+              <a:rPr lang="ko-KR" altLang="en-US" dirty="0"/>
+              <a:t> </a:t>
+            </a:r>
+            <a:r>
+              <a:rPr lang="en-US" altLang="ko-KR" dirty="0"/>
+              <a:t>pull</a:t>
+            </a:r>
+            <a:r>
+              <a:rPr lang="ko-KR" altLang="en-US" dirty="0"/>
+              <a:t>한다</a:t>
+            </a:r>
+            <a:r>
+              <a:rPr lang="en-US" altLang="ko-KR" dirty="0"/>
+              <a:t>.</a:t>
+            </a:r>
+          </a:p>
+          <a:p>
+            <a:r>
+              <a:rPr lang="en-US" altLang="ko-KR" dirty="0"/>
+              <a:t>Pull </a:t>
+            </a:r>
+            <a:r>
+              <a:rPr lang="ko-KR" altLang="en-US" dirty="0"/>
+              <a:t>명령어</a:t>
+            </a:r>
+            <a:endParaRPr lang="en-US" altLang="ko-KR" dirty="0"/>
+          </a:p>
+          <a:p>
+            <a:r>
+              <a:rPr lang="en-US" altLang="ko-KR" dirty="0"/>
+              <a:t>git</a:t>
+            </a:r>
+            <a:r>
+              <a:rPr lang="ko-KR" altLang="en-US" dirty="0"/>
+              <a:t> </a:t>
+            </a:r>
+            <a:r>
+              <a:rPr lang="en-US" altLang="ko-KR" dirty="0"/>
+              <a:t>pull</a:t>
+            </a:r>
+            <a:r>
+              <a:rPr lang="ko-KR" altLang="en-US" dirty="0"/>
+              <a:t> </a:t>
+            </a:r>
+            <a:r>
+              <a:rPr lang="en-US" altLang="ko-KR" dirty="0"/>
+              <a:t>origin master -</a:t>
+            </a:r>
+            <a:r>
+              <a:rPr lang="ko-KR" altLang="en-US" dirty="0"/>
+              <a:t> 지정한 </a:t>
+            </a:r>
+            <a:r>
+              <a:rPr lang="en-US" altLang="ko-KR" dirty="0"/>
+              <a:t>repo</a:t>
+            </a:r>
+            <a:r>
+              <a:rPr lang="ko-KR" altLang="en-US" dirty="0"/>
+              <a:t>에서 데이터를 가져온다</a:t>
+            </a:r>
           </a:p>
         </p:txBody>
       </p:sp>
     </p:spTree>
     <p:extLst>
       <p:ext uri="{BB962C8B-B14F-4D97-AF65-F5344CB8AC3E}">
-        <p14:creationId xmlns:p14="http://schemas.microsoft.com/office/powerpoint/2010/main" val="1118394014"/>
+        <p14:creationId xmlns:p14="http://schemas.microsoft.com/office/powerpoint/2010/main" val="4201277412"/>
       </p:ext>
     </p:extLst>
   </p:cSld>

</xml_diff>